<commit_message>
Added latest demo ppt for visualizations and analysis
</commit_message>
<xml_diff>
--- a/PPT and Documentations/groupA136_vis_and_analysis_student_demo_final_cleaning.pptx
+++ b/PPT and Documentations/groupA136_vis_and_analysis_student_demo_final_cleaning.pptx
@@ -6606,7 +6606,7 @@
         <p:spPr>
           <a:xfrm>
             <a:off x="819336" y="1562895"/>
-            <a:ext cx="11235012" cy="1200329"/>
+            <a:ext cx="11235012" cy="1569660"/>
           </a:xfrm>
           <a:prstGeom prst="rect">
             <a:avLst/>
@@ -6663,6 +6663,12 @@
               </a:rPr>
               <a:t>("Wilcoxon Rank-Sum Test:")</a:t>
             </a:r>
+          </a:p>
+          <a:p>
+            <a:pPr marL="285750" indent="-285750">
+              <a:buFont typeface="Arial" panose="020B0604020202020204" pitchFamily="34" charset="0"/>
+              <a:buChar char="•"/>
+            </a:pPr>
             <a:r>
               <a:rPr lang="en-GB" sz="2400" dirty="0" err="1">
                 <a:solidFill>
@@ -11184,14 +11190,6 @@
 </file>
 
 <file path=customXml/item1.xml><?xml version="1.0" encoding="utf-8"?>
-<p:properties xmlns:p="http://schemas.microsoft.com/office/2006/metadata/properties" xmlns:xsi="http://www.w3.org/2001/XMLSchema-instance" xmlns:pc="http://schemas.microsoft.com/office/infopath/2007/PartnerControls">
-  <documentManagement>
-    <Information xmlns="4ad138b4-2b68-4b70-945d-07f8f18b1c9a" xsi:nil="true"/>
-  </documentManagement>
-</p:properties>
-</file>
-
-<file path=customXml/item2.xml><?xml version="1.0" encoding="utf-8"?>
 <ct:contentTypeSchema xmlns:ct="http://schemas.microsoft.com/office/2006/metadata/contentType" xmlns:ma="http://schemas.microsoft.com/office/2006/metadata/properties/metaAttributes" ct:_="" ma:_="" ma:contentTypeName="Document" ma:contentTypeID="0x01010026DBA85F447B164191BB36C258697B67" ma:contentTypeVersion="14" ma:contentTypeDescription="Create a new document." ma:contentTypeScope="" ma:versionID="ea511d05ca7f895fe9556935b5c9af34">
   <xsd:schema xmlns:xsd="http://www.w3.org/2001/XMLSchema" xmlns:xs="http://www.w3.org/2001/XMLSchema" xmlns:p="http://schemas.microsoft.com/office/2006/metadata/properties" xmlns:ns2="4ad138b4-2b68-4b70-945d-07f8f18b1c9a" xmlns:ns3="3c474641-ec36-472f-b125-6b1b0910eaa4" targetNamespace="http://schemas.microsoft.com/office/2006/metadata/properties" ma:root="true" ma:fieldsID="662270106d7a7e100bcac2c5f8d29899" ns2:_="" ns3:_="">
     <xsd:import namespace="4ad138b4-2b68-4b70-945d-07f8f18b1c9a"/>
@@ -11416,6 +11414,14 @@
 </ct:contentTypeSchema>
 </file>
 
+<file path=customXml/item2.xml><?xml version="1.0" encoding="utf-8"?>
+<p:properties xmlns:p="http://schemas.microsoft.com/office/2006/metadata/properties" xmlns:xsi="http://www.w3.org/2001/XMLSchema-instance" xmlns:pc="http://schemas.microsoft.com/office/infopath/2007/PartnerControls">
+  <documentManagement>
+    <Information xmlns="4ad138b4-2b68-4b70-945d-07f8f18b1c9a" xsi:nil="true"/>
+  </documentManagement>
+</p:properties>
+</file>
+
 <file path=customXml/item3.xml><?xml version="1.0" encoding="utf-8"?>
 <?mso-contentType ?>
 <FormTemplates xmlns="http://schemas.microsoft.com/sharepoint/v3/contenttype/forms">
@@ -11426,23 +11432,6 @@
 </file>
 
 <file path=customXml/itemProps1.xml><?xml version="1.0" encoding="utf-8"?>
-<ds:datastoreItem xmlns:ds="http://schemas.openxmlformats.org/officeDocument/2006/customXml" ds:itemID="{EDD1FC41-23C7-41B0-B5F9-BF4CD38AD2ED}">
-  <ds:schemaRefs>
-    <ds:schemaRef ds:uri="3c474641-ec36-472f-b125-6b1b0910eaa4"/>
-    <ds:schemaRef ds:uri="4ad138b4-2b68-4b70-945d-07f8f18b1c9a"/>
-    <ds:schemaRef ds:uri="http://purl.org/dc/dcmitype/"/>
-    <ds:schemaRef ds:uri="http://purl.org/dc/elements/1.1/"/>
-    <ds:schemaRef ds:uri="http://purl.org/dc/terms/"/>
-    <ds:schemaRef ds:uri="http://schemas.microsoft.com/office/2006/documentManagement/types"/>
-    <ds:schemaRef ds:uri="http://schemas.microsoft.com/office/2006/metadata/properties"/>
-    <ds:schemaRef ds:uri="http://schemas.microsoft.com/office/infopath/2007/PartnerControls"/>
-    <ds:schemaRef ds:uri="http://schemas.openxmlformats.org/package/2006/metadata/core-properties"/>
-    <ds:schemaRef ds:uri="http://www.w3.org/XML/1998/namespace"/>
-  </ds:schemaRefs>
-</ds:datastoreItem>
-</file>
-
-<file path=customXml/itemProps2.xml><?xml version="1.0" encoding="utf-8"?>
 <ds:datastoreItem xmlns:ds="http://schemas.openxmlformats.org/officeDocument/2006/customXml" ds:itemID="{421B8C57-903D-4D0E-8336-7B512F760CD1}">
   <ds:schemaRefs>
     <ds:schemaRef ds:uri="3c474641-ec36-472f-b125-6b1b0910eaa4"/>
@@ -11461,6 +11450,23 @@
 </ds:datastoreItem>
 </file>
 
+<file path=customXml/itemProps2.xml><?xml version="1.0" encoding="utf-8"?>
+<ds:datastoreItem xmlns:ds="http://schemas.openxmlformats.org/officeDocument/2006/customXml" ds:itemID="{EDD1FC41-23C7-41B0-B5F9-BF4CD38AD2ED}">
+  <ds:schemaRefs>
+    <ds:schemaRef ds:uri="3c474641-ec36-472f-b125-6b1b0910eaa4"/>
+    <ds:schemaRef ds:uri="4ad138b4-2b68-4b70-945d-07f8f18b1c9a"/>
+    <ds:schemaRef ds:uri="http://purl.org/dc/dcmitype/"/>
+    <ds:schemaRef ds:uri="http://purl.org/dc/elements/1.1/"/>
+    <ds:schemaRef ds:uri="http://purl.org/dc/terms/"/>
+    <ds:schemaRef ds:uri="http://schemas.microsoft.com/office/2006/documentManagement/types"/>
+    <ds:schemaRef ds:uri="http://schemas.microsoft.com/office/2006/metadata/properties"/>
+    <ds:schemaRef ds:uri="http://schemas.microsoft.com/office/infopath/2007/PartnerControls"/>
+    <ds:schemaRef ds:uri="http://schemas.openxmlformats.org/package/2006/metadata/core-properties"/>
+    <ds:schemaRef ds:uri="http://www.w3.org/XML/1998/namespace"/>
+  </ds:schemaRefs>
+</ds:datastoreItem>
+</file>
+
 <file path=customXml/itemProps3.xml><?xml version="1.0" encoding="utf-8"?>
 <ds:datastoreItem xmlns:ds="http://schemas.openxmlformats.org/officeDocument/2006/customXml" ds:itemID="{91C521DD-2673-4EE6-BB9B-DC5C3320FFBB}">
   <ds:schemaRefs>

</xml_diff>

<commit_message>
Added explanation and captions to visualizations in report
</commit_message>
<xml_diff>
--- a/PPT and Documentations/groupA136_vis_and_analysis_student_demo_final_cleaning.pptx
+++ b/PPT and Documentations/groupA136_vis_and_analysis_student_demo_final_cleaning.pptx
@@ -254,7 +254,7 @@
             <a:fld id="{93FAAC3A-BD1F-4A00-9099-74B95789FE00}" type="datetimeFigureOut">
               <a:rPr lang="en-GB" smtClean="0"/>
               <a:pPr/>
-              <a:t>08/12/2025</a:t>
+              <a:t>09/12/2025</a:t>
             </a:fld>
             <a:endParaRPr lang="en-GB"/>
           </a:p>
@@ -605,7 +605,7 @@
             <a:fld id="{8E359C8A-39F6-4045-9163-4042C4C26B15}" type="datetimeFigureOut">
               <a:rPr lang="en-GB" smtClean="0"/>
               <a:pPr/>
-              <a:t>08/12/2025</a:t>
+              <a:t>09/12/2025</a:t>
             </a:fld>
             <a:endParaRPr lang="en-GB"/>
           </a:p>
@@ -6247,7 +6247,7 @@
         </p:nvSpPr>
         <p:spPr>
           <a:xfrm>
-            <a:off x="2972007" y="1943700"/>
+            <a:off x="2972007" y="1821071"/>
             <a:ext cx="6247745" cy="369332"/>
           </a:xfrm>
           <a:prstGeom prst="rect">
@@ -6262,22 +6262,18 @@
           <a:lstStyle/>
           <a:p>
             <a:r>
-              <a:rPr lang="en-US" dirty="0" err="1"/>
-              <a:t>Piechart</a:t>
-            </a:r>
-            <a:r>
               <a:rPr lang="en-US" dirty="0"/>
-              <a:t> of Depressed and Non-depressed students</a:t>
+              <a:t>Pie Chart of Depressed and Non-depressed students</a:t>
             </a:r>
           </a:p>
         </p:txBody>
       </p:sp>
       <p:pic>
         <p:nvPicPr>
-          <p:cNvPr id="4" name="Picture 3" descr="A pie chart with a red circle and blue circle&#10;&#10;AI-generated content may be incorrect.">
-            <a:extLst>
-              <a:ext uri="{FF2B5EF4-FFF2-40B4-BE49-F238E27FC236}">
-                <a16:creationId xmlns:a16="http://schemas.microsoft.com/office/drawing/2014/main" id="{E3C9DF46-F873-4FAD-34A5-77186279F371}"/>
+          <p:cNvPr id="3" name="Picture 2" descr="A pie chart with a red circle and blue circle&#10;&#10;AI-generated content may be incorrect.">
+            <a:extLst>
+              <a:ext uri="{FF2B5EF4-FFF2-40B4-BE49-F238E27FC236}">
+                <a16:creationId xmlns:a16="http://schemas.microsoft.com/office/drawing/2014/main" id="{28DCCB7F-5496-221F-2E3C-47852A19C7A2}"/>
               </a:ext>
             </a:extLst>
           </p:cNvPr>
@@ -6300,8 +6296,8 @@
         </p:blipFill>
         <p:spPr>
           <a:xfrm>
-            <a:off x="2192593" y="2497605"/>
-            <a:ext cx="7443019" cy="3687982"/>
+            <a:off x="2674134" y="2313032"/>
+            <a:ext cx="6545618" cy="4182580"/>
           </a:xfrm>
           <a:prstGeom prst="rect">
             <a:avLst/>
@@ -10072,10 +10068,10 @@
       </p:sp>
       <p:pic>
         <p:nvPicPr>
-          <p:cNvPr id="3" name="Picture 2" descr="A graph with blue bars and red line&#10;&#10;AI-generated content may be incorrect.">
-            <a:extLst>
-              <a:ext uri="{FF2B5EF4-FFF2-40B4-BE49-F238E27FC236}">
-                <a16:creationId xmlns:a16="http://schemas.microsoft.com/office/drawing/2014/main" id="{074D5352-A590-4DA8-185E-4409C7B41DBB}"/>
+          <p:cNvPr id="4" name="Picture 3" descr="A graph of a graph with blue bars and red line&#10;&#10;AI-generated content may be incorrect.">
+            <a:extLst>
+              <a:ext uri="{FF2B5EF4-FFF2-40B4-BE49-F238E27FC236}">
+                <a16:creationId xmlns:a16="http://schemas.microsoft.com/office/drawing/2014/main" id="{40B6DDC1-C295-09E2-9762-2332339BA4AC}"/>
               </a:ext>
             </a:extLst>
           </p:cNvPr>
@@ -10098,8 +10094,8 @@
         </p:blipFill>
         <p:spPr>
           <a:xfrm>
-            <a:off x="939872" y="2092128"/>
-            <a:ext cx="6145863" cy="4245143"/>
+            <a:off x="894828" y="2205511"/>
+            <a:ext cx="6205182" cy="3965044"/>
           </a:xfrm>
           <a:prstGeom prst="rect">
             <a:avLst/>
@@ -10240,12 +10236,61 @@
           </a:p>
         </p:txBody>
       </p:sp>
+      <p:sp>
+        <p:nvSpPr>
+          <p:cNvPr id="7" name="TextBox 6">
+            <a:extLst>
+              <a:ext uri="{FF2B5EF4-FFF2-40B4-BE49-F238E27FC236}">
+                <a16:creationId xmlns:a16="http://schemas.microsoft.com/office/drawing/2014/main" id="{241F9D6F-3193-4870-158F-AEA59E2B813F}"/>
+              </a:ext>
+            </a:extLst>
+          </p:cNvPr>
+          <p:cNvSpPr txBox="1"/>
+          <p:nvPr/>
+        </p:nvSpPr>
+        <p:spPr>
+          <a:xfrm>
+            <a:off x="7010400" y="2685820"/>
+            <a:ext cx="3480440" cy="646331"/>
+          </a:xfrm>
+          <a:prstGeom prst="rect">
+            <a:avLst/>
+          </a:prstGeom>
+          <a:noFill/>
+        </p:spPr>
+        <p:txBody>
+          <a:bodyPr wrap="none" rtlCol="0">
+            <a:spAutoFit/>
+          </a:bodyPr>
+          <a:lstStyle/>
+          <a:p>
+            <a:r>
+              <a:rPr lang="en-US" dirty="0">
+                <a:solidFill>
+                  <a:srgbClr val="FF0000"/>
+                </a:solidFill>
+              </a:rPr>
+              <a:t>Outliers have been removed for </a:t>
+            </a:r>
+          </a:p>
+          <a:p>
+            <a:r>
+              <a:rPr lang="en-US" dirty="0">
+                <a:solidFill>
+                  <a:srgbClr val="FF0000"/>
+                </a:solidFill>
+              </a:rPr>
+              <a:t>where CGPA = 0</a:t>
+            </a:r>
+          </a:p>
+        </p:txBody>
+      </p:sp>
       <p:pic>
         <p:nvPicPr>
-          <p:cNvPr id="6" name="Picture 5" descr="A graph of a comparison of a student's depression status&#10;&#10;AI-generated content may be incorrect.">
-            <a:extLst>
-              <a:ext uri="{FF2B5EF4-FFF2-40B4-BE49-F238E27FC236}">
-                <a16:creationId xmlns:a16="http://schemas.microsoft.com/office/drawing/2014/main" id="{0BE281F0-1C24-884C-CEFA-DF352793D2BA}"/>
+          <p:cNvPr id="5" name="Picture 4" descr="A graph of a comparison of students&#10;&#10;AI-generated content may be incorrect.">
+            <a:extLst>
+              <a:ext uri="{FF2B5EF4-FFF2-40B4-BE49-F238E27FC236}">
+                <a16:creationId xmlns:a16="http://schemas.microsoft.com/office/drawing/2014/main" id="{7E9BC938-B43B-08FE-BE63-865DB2A130E2}"/>
               </a:ext>
             </a:extLst>
           </p:cNvPr>
@@ -10268,63 +10313,14 @@
         </p:blipFill>
         <p:spPr>
           <a:xfrm>
-            <a:off x="1099031" y="1314336"/>
-            <a:ext cx="5842543" cy="4035630"/>
+            <a:off x="723780" y="1414026"/>
+            <a:ext cx="6168632" cy="3941689"/>
           </a:xfrm>
           <a:prstGeom prst="rect">
             <a:avLst/>
           </a:prstGeom>
         </p:spPr>
       </p:pic>
-      <p:sp>
-        <p:nvSpPr>
-          <p:cNvPr id="7" name="TextBox 6">
-            <a:extLst>
-              <a:ext uri="{FF2B5EF4-FFF2-40B4-BE49-F238E27FC236}">
-                <a16:creationId xmlns:a16="http://schemas.microsoft.com/office/drawing/2014/main" id="{241F9D6F-3193-4870-158F-AEA59E2B813F}"/>
-              </a:ext>
-            </a:extLst>
-          </p:cNvPr>
-          <p:cNvSpPr txBox="1"/>
-          <p:nvPr/>
-        </p:nvSpPr>
-        <p:spPr>
-          <a:xfrm>
-            <a:off x="7010400" y="2685820"/>
-            <a:ext cx="4673074" cy="646331"/>
-          </a:xfrm>
-          <a:prstGeom prst="rect">
-            <a:avLst/>
-          </a:prstGeom>
-          <a:noFill/>
-        </p:spPr>
-        <p:txBody>
-          <a:bodyPr wrap="none" rtlCol="0">
-            <a:spAutoFit/>
-          </a:bodyPr>
-          <a:lstStyle/>
-          <a:p>
-            <a:r>
-              <a:rPr lang="en-US" dirty="0">
-                <a:solidFill>
-                  <a:srgbClr val="FF0000"/>
-                </a:solidFill>
-              </a:rPr>
-              <a:t>Outliers have been removed for two records</a:t>
-            </a:r>
-          </a:p>
-          <a:p>
-            <a:r>
-              <a:rPr lang="en-US" dirty="0">
-                <a:solidFill>
-                  <a:srgbClr val="FF0000"/>
-                </a:solidFill>
-              </a:rPr>
-              <a:t>where CGPA = 0 for not depressed students</a:t>
-            </a:r>
-          </a:p>
-        </p:txBody>
-      </p:sp>
     </p:spTree>
     <p:extLst>
       <p:ext uri="{BB962C8B-B14F-4D97-AF65-F5344CB8AC3E}">
@@ -11190,6 +11186,14 @@
 </file>
 
 <file path=customXml/item1.xml><?xml version="1.0" encoding="utf-8"?>
+<p:properties xmlns:p="http://schemas.microsoft.com/office/2006/metadata/properties" xmlns:xsi="http://www.w3.org/2001/XMLSchema-instance" xmlns:pc="http://schemas.microsoft.com/office/infopath/2007/PartnerControls">
+  <documentManagement>
+    <Information xmlns="4ad138b4-2b68-4b70-945d-07f8f18b1c9a" xsi:nil="true"/>
+  </documentManagement>
+</p:properties>
+</file>
+
+<file path=customXml/item2.xml><?xml version="1.0" encoding="utf-8"?>
 <ct:contentTypeSchema xmlns:ct="http://schemas.microsoft.com/office/2006/metadata/contentType" xmlns:ma="http://schemas.microsoft.com/office/2006/metadata/properties/metaAttributes" ct:_="" ma:_="" ma:contentTypeName="Document" ma:contentTypeID="0x01010026DBA85F447B164191BB36C258697B67" ma:contentTypeVersion="14" ma:contentTypeDescription="Create a new document." ma:contentTypeScope="" ma:versionID="ea511d05ca7f895fe9556935b5c9af34">
   <xsd:schema xmlns:xsd="http://www.w3.org/2001/XMLSchema" xmlns:xs="http://www.w3.org/2001/XMLSchema" xmlns:p="http://schemas.microsoft.com/office/2006/metadata/properties" xmlns:ns2="4ad138b4-2b68-4b70-945d-07f8f18b1c9a" xmlns:ns3="3c474641-ec36-472f-b125-6b1b0910eaa4" targetNamespace="http://schemas.microsoft.com/office/2006/metadata/properties" ma:root="true" ma:fieldsID="662270106d7a7e100bcac2c5f8d29899" ns2:_="" ns3:_="">
     <xsd:import namespace="4ad138b4-2b68-4b70-945d-07f8f18b1c9a"/>
@@ -11414,14 +11418,6 @@
 </ct:contentTypeSchema>
 </file>
 
-<file path=customXml/item2.xml><?xml version="1.0" encoding="utf-8"?>
-<p:properties xmlns:p="http://schemas.microsoft.com/office/2006/metadata/properties" xmlns:xsi="http://www.w3.org/2001/XMLSchema-instance" xmlns:pc="http://schemas.microsoft.com/office/infopath/2007/PartnerControls">
-  <documentManagement>
-    <Information xmlns="4ad138b4-2b68-4b70-945d-07f8f18b1c9a" xsi:nil="true"/>
-  </documentManagement>
-</p:properties>
-</file>
-
 <file path=customXml/item3.xml><?xml version="1.0" encoding="utf-8"?>
 <?mso-contentType ?>
 <FormTemplates xmlns="http://schemas.microsoft.com/sharepoint/v3/contenttype/forms">
@@ -11432,6 +11428,23 @@
 </file>
 
 <file path=customXml/itemProps1.xml><?xml version="1.0" encoding="utf-8"?>
+<ds:datastoreItem xmlns:ds="http://schemas.openxmlformats.org/officeDocument/2006/customXml" ds:itemID="{EDD1FC41-23C7-41B0-B5F9-BF4CD38AD2ED}">
+  <ds:schemaRefs>
+    <ds:schemaRef ds:uri="3c474641-ec36-472f-b125-6b1b0910eaa4"/>
+    <ds:schemaRef ds:uri="4ad138b4-2b68-4b70-945d-07f8f18b1c9a"/>
+    <ds:schemaRef ds:uri="http://purl.org/dc/dcmitype/"/>
+    <ds:schemaRef ds:uri="http://purl.org/dc/elements/1.1/"/>
+    <ds:schemaRef ds:uri="http://purl.org/dc/terms/"/>
+    <ds:schemaRef ds:uri="http://schemas.microsoft.com/office/2006/documentManagement/types"/>
+    <ds:schemaRef ds:uri="http://schemas.microsoft.com/office/2006/metadata/properties"/>
+    <ds:schemaRef ds:uri="http://schemas.microsoft.com/office/infopath/2007/PartnerControls"/>
+    <ds:schemaRef ds:uri="http://schemas.openxmlformats.org/package/2006/metadata/core-properties"/>
+    <ds:schemaRef ds:uri="http://www.w3.org/XML/1998/namespace"/>
+  </ds:schemaRefs>
+</ds:datastoreItem>
+</file>
+
+<file path=customXml/itemProps2.xml><?xml version="1.0" encoding="utf-8"?>
 <ds:datastoreItem xmlns:ds="http://schemas.openxmlformats.org/officeDocument/2006/customXml" ds:itemID="{421B8C57-903D-4D0E-8336-7B512F760CD1}">
   <ds:schemaRefs>
     <ds:schemaRef ds:uri="3c474641-ec36-472f-b125-6b1b0910eaa4"/>
@@ -11450,23 +11463,6 @@
 </ds:datastoreItem>
 </file>
 
-<file path=customXml/itemProps2.xml><?xml version="1.0" encoding="utf-8"?>
-<ds:datastoreItem xmlns:ds="http://schemas.openxmlformats.org/officeDocument/2006/customXml" ds:itemID="{EDD1FC41-23C7-41B0-B5F9-BF4CD38AD2ED}">
-  <ds:schemaRefs>
-    <ds:schemaRef ds:uri="3c474641-ec36-472f-b125-6b1b0910eaa4"/>
-    <ds:schemaRef ds:uri="4ad138b4-2b68-4b70-945d-07f8f18b1c9a"/>
-    <ds:schemaRef ds:uri="http://purl.org/dc/dcmitype/"/>
-    <ds:schemaRef ds:uri="http://purl.org/dc/elements/1.1/"/>
-    <ds:schemaRef ds:uri="http://purl.org/dc/terms/"/>
-    <ds:schemaRef ds:uri="http://schemas.microsoft.com/office/2006/documentManagement/types"/>
-    <ds:schemaRef ds:uri="http://schemas.microsoft.com/office/2006/metadata/properties"/>
-    <ds:schemaRef ds:uri="http://schemas.microsoft.com/office/infopath/2007/PartnerControls"/>
-    <ds:schemaRef ds:uri="http://schemas.openxmlformats.org/package/2006/metadata/core-properties"/>
-    <ds:schemaRef ds:uri="http://www.w3.org/XML/1998/namespace"/>
-  </ds:schemaRefs>
-</ds:datastoreItem>
-</file>
-
 <file path=customXml/itemProps3.xml><?xml version="1.0" encoding="utf-8"?>
 <ds:datastoreItem xmlns:ds="http://schemas.openxmlformats.org/officeDocument/2006/customXml" ds:itemID="{91C521DD-2673-4EE6-BB9B-DC5C3320FFBB}">
   <ds:schemaRefs>

</xml_diff>